<commit_message>
Add temporary data-slides with screenshot
</commit_message>
<xml_diff>
--- a/G21_ChP01_Presentation.pptx
+++ b/G21_ChP01_Presentation.pptx
@@ -20,7 +20,7 @@
     <p:sldId id="1102" r:id="rId8"/>
     <p:sldId id="1105" r:id="rId9"/>
     <p:sldId id="1103" r:id="rId10"/>
-    <p:sldId id="1104" r:id="rId11"/>
+    <p:sldId id="1106" r:id="rId11"/>
   </p:sldIdLst>
   <p:sldSz cx="9144000" cy="6858000" type="screen4x3"/>
   <p:notesSz cx="6858000" cy="9144000"/>
@@ -220,7 +220,7 @@
           <a:p>
             <a:fld id="{745C36E7-9E00-462E-80A3-32F2BE615C7A}" type="datetimeFigureOut">
               <a:rPr lang="en-US" smtClean="0"/>
-              <a:t>9/30/2019</a:t>
+              <a:t>9/30/19</a:t>
             </a:fld>
             <a:endParaRPr lang="en-US"/>
           </a:p>
@@ -386,7 +386,7 @@
             <a:fld id="{01F3E309-ED8D-4193-99AF-E5EA90965E98}" type="datetimeFigureOut">
               <a:rPr lang="en-US" smtClean="0"/>
               <a:pPr/>
-              <a:t>9/30/2019</a:t>
+              <a:t>9/30/19</a:t>
             </a:fld>
             <a:endParaRPr lang="en-US"/>
           </a:p>
@@ -986,7 +986,7 @@
     </p:spTree>
     <p:extLst>
       <p:ext uri="{BB962C8B-B14F-4D97-AF65-F5344CB8AC3E}">
-        <p14:creationId xmlns:p14="http://schemas.microsoft.com/office/powerpoint/2010/main" val="35205596"/>
+        <p14:creationId xmlns:p14="http://schemas.microsoft.com/office/powerpoint/2010/main" val="1319374358"/>
       </p:ext>
     </p:extLst>
   </p:cSld>
@@ -1488,7 +1488,7 @@
             <a:fld id="{F3CC9924-33BC-4796-B0F9-D37DB5D899BF}" type="datetimeFigureOut">
               <a:rPr lang="pt-PT" smtClean="0"/>
               <a:pPr/>
-              <a:t>30/09/2019</a:t>
+              <a:t>30/09/19</a:t>
             </a:fld>
             <a:endParaRPr lang="pt-PT"/>
           </a:p>
@@ -3666,15 +3666,42 @@
               </a:spcBef>
             </a:pPr>
             <a:r>
-              <a:rPr lang="en-US" sz="2800" dirty="0">
+              <a:rPr lang="pt-PT" sz="2000" dirty="0">
                 <a:solidFill>
                   <a:schemeClr val="tx1"/>
                 </a:solidFill>
                 <a:latin typeface="Courier New" panose="02070309020205020404" pitchFamily="49" charset="0"/>
                 <a:cs typeface="Courier New" panose="02070309020205020404" pitchFamily="49" charset="0"/>
               </a:rPr>
-              <a:t>(from “xpto.csv”)</a:t>
-            </a:r>
+              <a:t>(</a:t>
+            </a:r>
+            <a:r>
+              <a:rPr lang="pt-PT" sz="2000" dirty="0" err="1">
+                <a:solidFill>
+                  <a:schemeClr val="tx1"/>
+                </a:solidFill>
+                <a:latin typeface="Courier New" panose="02070309020205020404" pitchFamily="49" charset="0"/>
+                <a:cs typeface="Courier New" panose="02070309020205020404" pitchFamily="49" charset="0"/>
+              </a:rPr>
+              <a:t>from</a:t>
+            </a:r>
+            <a:r>
+              <a:rPr lang="pt-PT" sz="2000" dirty="0">
+                <a:solidFill>
+                  <a:schemeClr val="tx1"/>
+                </a:solidFill>
+                <a:latin typeface="Courier New" panose="02070309020205020404" pitchFamily="49" charset="0"/>
+                <a:cs typeface="Courier New" panose="02070309020205020404" pitchFamily="49" charset="0"/>
+              </a:rPr>
+              <a:t> Student_Mobility_2013-14.xlsx)</a:t>
+            </a:r>
+          </a:p>
+          <a:p>
+            <a:pPr>
+              <a:spcBef>
+                <a:spcPts val="0"/>
+              </a:spcBef>
+            </a:pPr>
             <a:endParaRPr lang="pt-PT" sz="2800" dirty="0">
               <a:solidFill>
                 <a:schemeClr val="tx1"/>
@@ -3689,30 +3716,6 @@
                 <a:spcPts val="0"/>
               </a:spcBef>
             </a:pPr>
-            <a:endParaRPr lang="en-US" sz="2800" dirty="0">
-              <a:solidFill>
-                <a:schemeClr val="tx1"/>
-              </a:solidFill>
-              <a:latin typeface="Courier New" panose="02070309020205020404" pitchFamily="49" charset="0"/>
-              <a:cs typeface="Courier New" panose="02070309020205020404" pitchFamily="49" charset="0"/>
-            </a:endParaRPr>
-          </a:p>
-          <a:p>
-            <a:pPr>
-              <a:spcBef>
-                <a:spcPts val="0"/>
-              </a:spcBef>
-            </a:pPr>
-            <a:r>
-              <a:rPr lang="en-US" sz="2800" dirty="0">
-                <a:solidFill>
-                  <a:schemeClr val="tx1"/>
-                </a:solidFill>
-                <a:latin typeface="Courier New" panose="02070309020205020404" pitchFamily="49" charset="0"/>
-                <a:cs typeface="Courier New" panose="02070309020205020404" pitchFamily="49" charset="0"/>
-              </a:rPr>
-              <a:t>year; name; cost; rating</a:t>
-            </a:r>
             <a:endParaRPr lang="pt-PT" sz="2800" dirty="0">
               <a:solidFill>
                 <a:schemeClr val="tx1"/>
@@ -3727,16 +3730,6 @@
                 <a:spcPts val="0"/>
               </a:spcBef>
             </a:pPr>
-            <a:r>
-              <a:rPr lang="en-US" sz="2800" dirty="0">
-                <a:solidFill>
-                  <a:schemeClr val="tx1"/>
-                </a:solidFill>
-                <a:latin typeface="Courier New" panose="02070309020205020404" pitchFamily="49" charset="0"/>
-                <a:cs typeface="Courier New" panose="02070309020205020404" pitchFamily="49" charset="0"/>
-              </a:rPr>
-              <a:t>2012; Potatoes; 12000; 4</a:t>
-            </a:r>
             <a:endParaRPr lang="pt-PT" sz="2800" dirty="0">
               <a:solidFill>
                 <a:schemeClr val="tx1"/>
@@ -3747,10 +3740,70 @@
           </a:p>
         </p:txBody>
       </p:sp>
+      <p:pic>
+        <p:nvPicPr>
+          <p:cNvPr id="4" name="Picture 3">
+            <a:extLst>
+              <a:ext uri="{FF2B5EF4-FFF2-40B4-BE49-F238E27FC236}">
+                <a16:creationId xmlns:a16="http://schemas.microsoft.com/office/drawing/2014/main" id="{B0468F15-7F44-6548-BF9F-73E28CA2DC14}"/>
+              </a:ext>
+            </a:extLst>
+          </p:cNvPr>
+          <p:cNvPicPr>
+            <a:picLocks noChangeAspect="1"/>
+          </p:cNvPicPr>
+          <p:nvPr/>
+        </p:nvPicPr>
+        <p:blipFill>
+          <a:blip r:embed="rId3"/>
+          <a:stretch>
+            <a:fillRect/>
+          </a:stretch>
+        </p:blipFill>
+        <p:spPr>
+          <a:xfrm>
+            <a:off x="0" y="2122854"/>
+            <a:ext cx="8966200" cy="558800"/>
+          </a:xfrm>
+          <a:prstGeom prst="rect">
+            <a:avLst/>
+          </a:prstGeom>
+        </p:spPr>
+      </p:pic>
+      <p:pic>
+        <p:nvPicPr>
+          <p:cNvPr id="5" name="Picture 4">
+            <a:extLst>
+              <a:ext uri="{FF2B5EF4-FFF2-40B4-BE49-F238E27FC236}">
+                <a16:creationId xmlns:a16="http://schemas.microsoft.com/office/drawing/2014/main" id="{23593C7F-815B-3842-BA1E-9A18BF9934F0}"/>
+              </a:ext>
+            </a:extLst>
+          </p:cNvPr>
+          <p:cNvPicPr>
+            <a:picLocks noChangeAspect="1"/>
+          </p:cNvPicPr>
+          <p:nvPr/>
+        </p:nvPicPr>
+        <p:blipFill>
+          <a:blip r:embed="rId4"/>
+          <a:stretch>
+            <a:fillRect/>
+          </a:stretch>
+        </p:blipFill>
+        <p:spPr>
+          <a:xfrm>
+            <a:off x="457200" y="3284984"/>
+            <a:ext cx="6249376" cy="2887703"/>
+          </a:xfrm>
+          <a:prstGeom prst="rect">
+            <a:avLst/>
+          </a:prstGeom>
+        </p:spPr>
+      </p:pic>
     </p:spTree>
     <p:extLst>
       <p:ext uri="{BB962C8B-B14F-4D97-AF65-F5344CB8AC3E}">
-        <p14:creationId xmlns:p14="http://schemas.microsoft.com/office/powerpoint/2010/main" val="2292396113"/>
+        <p14:creationId xmlns:p14="http://schemas.microsoft.com/office/powerpoint/2010/main" val="633722846"/>
       </p:ext>
     </p:extLst>
   </p:cSld>

</xml_diff>